<commit_message>
Switched sessions 3 and 4
</commit_message>
<xml_diff>
--- a/2-Web-Dev/netcore-workshop-webdev.pptx
+++ b/2-Web-Dev/netcore-workshop-webdev.pptx
@@ -119,7 +119,7 @@
   <p:extLst>
     <p:ext uri="{521415D9-36F7-43E2-AB2F-B90AF26B5E84}">
       <p14:sectionLst xmlns:p14="http://schemas.microsoft.com/office/powerpoint/2010/main">
-        <p14:section name="Ignite 2016 Template Light" id="{A073DAE3-B461-442F-A3D3-6642BD875E45}">
+        <p14:section name="Main" id="{A073DAE3-B461-442F-A3D3-6642BD875E45}">
           <p14:sldIdLst>
             <p14:sldId id="1393"/>
             <p14:sldId id="1667"/>
@@ -258,7 +258,7 @@
               <a:rPr lang="en-US" smtClean="0">
                 <a:latin typeface="Segoe UI" pitchFamily="34" charset="0"/>
               </a:rPr>
-              <a:t>5/2/2017 3:59 PM</a:t>
+              <a:t>5/2/2017 11:28 PM</a:t>
             </a:fld>
             <a:endParaRPr lang="en-US" dirty="0">
               <a:latin typeface="Segoe UI" pitchFamily="34" charset="0"/>
@@ -539,7 +539,7 @@
           <a:p>
             <a:fld id="{38EEC551-8CDA-4EB6-89BB-2A86C9F091C8}" type="datetime8">
               <a:rPr lang="en-US" smtClean="0"/>
-              <a:t>5/2/2017 3:59 PM</a:t>
+              <a:t>5/2/2017 11:27 PM</a:t>
             </a:fld>
             <a:endParaRPr lang="en-US" dirty="0"/>
           </a:p>
@@ -956,7 +956,7 @@
           <a:p>
             <a:fld id="{38EEC551-8CDA-4EB6-89BB-2A86C9F091C8}" type="datetime8">
               <a:rPr lang="en-US" smtClean="0"/>
-              <a:t>5/2/2017 3:59 PM</a:t>
+              <a:t>5/2/2017 11:27 PM</a:t>
             </a:fld>
             <a:endParaRPr lang="en-US" dirty="0"/>
           </a:p>
@@ -1141,7 +1141,7 @@
           <a:p>
             <a:fld id="{38EEC551-8CDA-4EB6-89BB-2A86C9F091C8}" type="datetime8">
               <a:rPr lang="en-US" smtClean="0"/>
-              <a:t>5/2/2017 3:59 PM</a:t>
+              <a:t>5/2/2017 11:27 PM</a:t>
             </a:fld>
             <a:endParaRPr lang="en-US" dirty="0"/>
           </a:p>
@@ -1326,7 +1326,7 @@
           <a:p>
             <a:fld id="{38EEC551-8CDA-4EB6-89BB-2A86C9F091C8}" type="datetime8">
               <a:rPr lang="en-US" smtClean="0"/>
-              <a:t>5/2/2017 3:59 PM</a:t>
+              <a:t>5/2/2017 11:27 PM</a:t>
             </a:fld>
             <a:endParaRPr lang="en-US" dirty="0"/>
           </a:p>
@@ -1511,7 +1511,7 @@
           <a:p>
             <a:fld id="{38EEC551-8CDA-4EB6-89BB-2A86C9F091C8}" type="datetime8">
               <a:rPr lang="en-US" smtClean="0"/>
-              <a:t>5/2/2017 3:59 PM</a:t>
+              <a:t>5/2/2017 11:27 PM</a:t>
             </a:fld>
             <a:endParaRPr lang="en-US" dirty="0"/>
           </a:p>
@@ -1696,7 +1696,7 @@
           <a:p>
             <a:fld id="{38EEC551-8CDA-4EB6-89BB-2A86C9F091C8}" type="datetime8">
               <a:rPr lang="en-US" smtClean="0"/>
-              <a:t>5/2/2017 3:59 PM</a:t>
+              <a:t>5/2/2017 11:27 PM</a:t>
             </a:fld>
             <a:endParaRPr lang="en-US" dirty="0"/>
           </a:p>
@@ -1999,7 +1999,7 @@
                 <a:tabLst/>
                 <a:defRPr/>
               </a:pPr>
-              <a:t>5/2/2017 3:59 PM</a:t>
+              <a:t>5/2/2017 11:27 PM</a:t>
             </a:fld>
             <a:endParaRPr kumimoji="0" lang="en-US" sz="1200" b="0" i="0" u="none" strike="noStrike" kern="1200" cap="none" spc="0" normalizeH="0" baseline="0" noProof="0" dirty="0">
               <a:ln>
@@ -17066,6 +17066,21 @@
 </file>
 
 <file path=customXml/item1.xml><?xml version="1.0" encoding="utf-8"?>
+<p:properties xmlns:p="http://schemas.microsoft.com/office/2006/metadata/properties" xmlns:xsi="http://www.w3.org/2001/XMLSchema-instance" xmlns:pc="http://schemas.microsoft.com/office/infopath/2007/PartnerControls">
+  <documentManagement/>
+</p:properties>
+</file>
+
+<file path=customXml/item2.xml><?xml version="1.0" encoding="utf-8"?>
+<?mso-contentType ?>
+<FormTemplates xmlns="http://schemas.microsoft.com/sharepoint/v3/contenttype/forms">
+  <Display>DocumentLibraryForm</Display>
+  <Edit>DocumentLibraryForm</Edit>
+  <New>DocumentLibraryForm</New>
+</FormTemplates>
+</file>
+
+<file path=customXml/item3.xml><?xml version="1.0" encoding="utf-8"?>
 <ct:contentTypeSchema xmlns:ct="http://schemas.microsoft.com/office/2006/metadata/contentType" xmlns:ma="http://schemas.microsoft.com/office/2006/metadata/properties/metaAttributes" ct:_="" ma:_="" ma:contentTypeName="Document" ma:contentTypeID="0x0101004C8AF336095DB84A94AB1A4B939C0475" ma:contentTypeVersion="4" ma:contentTypeDescription="Create a new document." ma:contentTypeScope="" ma:versionID="6f8327450122d2e4aedd139501eaa58b">
   <xsd:schema xmlns:xsd="http://www.w3.org/2001/XMLSchema" xmlns:xs="http://www.w3.org/2001/XMLSchema" xmlns:p="http://schemas.microsoft.com/office/2006/metadata/properties" xmlns:ns2="29eeffc7-3a1a-4f16-995c-1b7b58342919" targetNamespace="http://schemas.microsoft.com/office/2006/metadata/properties" ma:root="true" ma:fieldsID="7d6c3be25c216b690a82d24b3f2244b5" ns2:_="">
     <xsd:import namespace="29eeffc7-3a1a-4f16-995c-1b7b58342919"/>
@@ -17227,22 +17242,31 @@
 </ct:contentTypeSchema>
 </file>
 
-<file path=customXml/item2.xml><?xml version="1.0" encoding="utf-8"?>
-<?mso-contentType ?>
-<FormTemplates xmlns="http://schemas.microsoft.com/sharepoint/v3/contenttype/forms">
-  <Display>DocumentLibraryForm</Display>
-  <Edit>DocumentLibraryForm</Edit>
-  <New>DocumentLibraryForm</New>
-</FormTemplates>
+<file path=customXml/itemProps1.xml><?xml version="1.0" encoding="utf-8"?>
+<ds:datastoreItem xmlns:ds="http://schemas.openxmlformats.org/officeDocument/2006/customXml" ds:itemID="{F990F116-B58F-4255-B05B-DA3808E0E5C6}">
+  <ds:schemaRefs>
+    <ds:schemaRef ds:uri="http://purl.org/dc/terms/"/>
+    <ds:schemaRef ds:uri="29eeffc7-3a1a-4f16-995c-1b7b58342919"/>
+    <ds:schemaRef ds:uri="http://schemas.microsoft.com/office/infopath/2007/PartnerControls"/>
+    <ds:schemaRef ds:uri="http://purl.org/dc/elements/1.1/"/>
+    <ds:schemaRef ds:uri="http://schemas.microsoft.com/office/2006/documentManagement/types"/>
+    <ds:schemaRef ds:uri="http://schemas.microsoft.com/office/2006/metadata/properties"/>
+    <ds:schemaRef ds:uri="http://schemas.openxmlformats.org/package/2006/metadata/core-properties"/>
+    <ds:schemaRef ds:uri="http://www.w3.org/XML/1998/namespace"/>
+    <ds:schemaRef ds:uri="http://purl.org/dc/dcmitype/"/>
+  </ds:schemaRefs>
+</ds:datastoreItem>
 </file>
 
-<file path=customXml/item3.xml><?xml version="1.0" encoding="utf-8"?>
-<p:properties xmlns:p="http://schemas.microsoft.com/office/2006/metadata/properties" xmlns:xsi="http://www.w3.org/2001/XMLSchema-instance" xmlns:pc="http://schemas.microsoft.com/office/infopath/2007/PartnerControls">
-  <documentManagement/>
-</p:properties>
+<file path=customXml/itemProps2.xml><?xml version="1.0" encoding="utf-8"?>
+<ds:datastoreItem xmlns:ds="http://schemas.openxmlformats.org/officeDocument/2006/customXml" ds:itemID="{758FDAC0-319D-4A54-8D8E-1D42CB1F8004}">
+  <ds:schemaRefs>
+    <ds:schemaRef ds:uri="http://schemas.microsoft.com/sharepoint/v3/contenttype/forms"/>
+  </ds:schemaRefs>
+</ds:datastoreItem>
 </file>
 
-<file path=customXml/itemProps1.xml><?xml version="1.0" encoding="utf-8"?>
+<file path=customXml/itemProps3.xml><?xml version="1.0" encoding="utf-8"?>
 <ds:datastoreItem xmlns:ds="http://schemas.openxmlformats.org/officeDocument/2006/customXml" ds:itemID="{4C47C6CA-B255-4F53-A8A9-1A4E6D0653D8}">
   <ds:schemaRefs>
     <ds:schemaRef ds:uri="http://schemas.microsoft.com/office/2006/metadata/contentType"/>
@@ -17258,28 +17282,4 @@
     <ds:schemaRef ds:uri="http://schemas.microsoft.com/internal/obd"/>
   </ds:schemaRefs>
 </ds:datastoreItem>
-</file>
-
-<file path=customXml/itemProps2.xml><?xml version="1.0" encoding="utf-8"?>
-<ds:datastoreItem xmlns:ds="http://schemas.openxmlformats.org/officeDocument/2006/customXml" ds:itemID="{758FDAC0-319D-4A54-8D8E-1D42CB1F8004}">
-  <ds:schemaRefs>
-    <ds:schemaRef ds:uri="http://schemas.microsoft.com/sharepoint/v3/contenttype/forms"/>
-  </ds:schemaRefs>
-</ds:datastoreItem>
-</file>
-
-<file path=customXml/itemProps3.xml><?xml version="1.0" encoding="utf-8"?>
-<ds:datastoreItem xmlns:ds="http://schemas.openxmlformats.org/officeDocument/2006/customXml" ds:itemID="{F990F116-B58F-4255-B05B-DA3808E0E5C6}">
-  <ds:schemaRefs>
-    <ds:schemaRef ds:uri="http://purl.org/dc/terms/"/>
-    <ds:schemaRef ds:uri="29eeffc7-3a1a-4f16-995c-1b7b58342919"/>
-    <ds:schemaRef ds:uri="http://schemas.microsoft.com/office/infopath/2007/PartnerControls"/>
-    <ds:schemaRef ds:uri="http://purl.org/dc/elements/1.1/"/>
-    <ds:schemaRef ds:uri="http://schemas.microsoft.com/office/2006/documentManagement/types"/>
-    <ds:schemaRef ds:uri="http://schemas.microsoft.com/office/2006/metadata/properties"/>
-    <ds:schemaRef ds:uri="http://schemas.openxmlformats.org/package/2006/metadata/core-properties"/>
-    <ds:schemaRef ds:uri="http://www.w3.org/XML/1998/namespace"/>
-    <ds:schemaRef ds:uri="http://purl.org/dc/dcmitype/"/>
-  </ds:schemaRefs>
-</ds:datastoreItem>
 </file>
</xml_diff>

<commit_message>
[WIP] Updates to decks 1 and 2
</commit_message>
<xml_diff>
--- a/2-Web-Dev/netcore-workshop-webdev.pptx
+++ b/2-Web-Dev/netcore-workshop-webdev.pptx
@@ -291,7 +291,7 @@
               <a:rPr lang="en-US" smtClean="0">
                 <a:latin typeface="Segoe UI" pitchFamily="34" charset="0"/>
               </a:rPr>
-              <a:t>9/14/2017 6:42 PM</a:t>
+              <a:t>9/15/2017 11:52 AM</a:t>
             </a:fld>
             <a:endParaRPr lang="en-US" dirty="0">
               <a:latin typeface="Segoe UI" pitchFamily="34" charset="0"/>
@@ -572,7 +572,7 @@
           <a:p>
             <a:fld id="{38EEC551-8CDA-4EB6-89BB-2A86C9F091C8}" type="datetime8">
               <a:rPr lang="en-US" smtClean="0"/>
-              <a:t>9/14/2017 6:41 PM</a:t>
+              <a:t>9/15/2017 11:51 AM</a:t>
             </a:fld>
             <a:endParaRPr lang="en-US" dirty="0"/>
           </a:p>
@@ -989,7 +989,7 @@
           <a:p>
             <a:fld id="{38EEC551-8CDA-4EB6-89BB-2A86C9F091C8}" type="datetime8">
               <a:rPr lang="en-US" smtClean="0"/>
-              <a:t>9/14/2017 6:41 PM</a:t>
+              <a:t>9/15/2017 11:51 AM</a:t>
             </a:fld>
             <a:endParaRPr lang="en-US" dirty="0"/>
           </a:p>
@@ -1174,7 +1174,7 @@
           <a:p>
             <a:fld id="{38EEC551-8CDA-4EB6-89BB-2A86C9F091C8}" type="datetime8">
               <a:rPr lang="en-US" smtClean="0"/>
-              <a:t>9/14/2017 6:41 PM</a:t>
+              <a:t>9/15/2017 11:51 AM</a:t>
             </a:fld>
             <a:endParaRPr lang="en-US" dirty="0"/>
           </a:p>
@@ -1359,7 +1359,7 @@
           <a:p>
             <a:fld id="{38EEC551-8CDA-4EB6-89BB-2A86C9F091C8}" type="datetime8">
               <a:rPr lang="en-US" smtClean="0"/>
-              <a:t>9/14/2017 6:41 PM</a:t>
+              <a:t>9/15/2017 11:51 AM</a:t>
             </a:fld>
             <a:endParaRPr lang="en-US" dirty="0"/>
           </a:p>
@@ -1544,7 +1544,7 @@
           <a:p>
             <a:fld id="{38EEC551-8CDA-4EB6-89BB-2A86C9F091C8}" type="datetime8">
               <a:rPr lang="en-US" smtClean="0"/>
-              <a:t>9/14/2017 6:41 PM</a:t>
+              <a:t>9/15/2017 11:51 AM</a:t>
             </a:fld>
             <a:endParaRPr lang="en-US" dirty="0"/>
           </a:p>
@@ -1729,7 +1729,7 @@
           <a:p>
             <a:fld id="{38EEC551-8CDA-4EB6-89BB-2A86C9F091C8}" type="datetime8">
               <a:rPr lang="en-US" smtClean="0"/>
-              <a:t>9/14/2017 6:41 PM</a:t>
+              <a:t>9/15/2017 11:51 AM</a:t>
             </a:fld>
             <a:endParaRPr lang="en-US" dirty="0"/>
           </a:p>
@@ -1914,7 +1914,7 @@
           <a:p>
             <a:fld id="{38EEC551-8CDA-4EB6-89BB-2A86C9F091C8}" type="datetime8">
               <a:rPr lang="en-US" smtClean="0"/>
-              <a:t>9/14/2017 6:41 PM</a:t>
+              <a:t>9/15/2017 11:51 AM</a:t>
             </a:fld>
             <a:endParaRPr lang="en-US" dirty="0"/>
           </a:p>
@@ -2099,7 +2099,7 @@
           <a:p>
             <a:fld id="{38EEC551-8CDA-4EB6-89BB-2A86C9F091C8}" type="datetime8">
               <a:rPr lang="en-US" smtClean="0"/>
-              <a:t>9/14/2017 6:41 PM</a:t>
+              <a:t>9/15/2017 11:51 AM</a:t>
             </a:fld>
             <a:endParaRPr lang="en-US" dirty="0"/>
           </a:p>
@@ -2284,7 +2284,7 @@
           <a:p>
             <a:fld id="{38EEC551-8CDA-4EB6-89BB-2A86C9F091C8}" type="datetime8">
               <a:rPr lang="en-US" smtClean="0"/>
-              <a:t>9/14/2017 6:41 PM</a:t>
+              <a:t>9/15/2017 11:51 AM</a:t>
             </a:fld>
             <a:endParaRPr lang="en-US" dirty="0"/>
           </a:p>
@@ -2469,7 +2469,7 @@
           <a:p>
             <a:fld id="{38EEC551-8CDA-4EB6-89BB-2A86C9F091C8}" type="datetime8">
               <a:rPr lang="en-US" smtClean="0"/>
-              <a:t>9/14/2017 6:41 PM</a:t>
+              <a:t>9/15/2017 11:51 AM</a:t>
             </a:fld>
             <a:endParaRPr lang="en-US" dirty="0"/>
           </a:p>
@@ -2654,7 +2654,7 @@
           <a:p>
             <a:fld id="{38EEC551-8CDA-4EB6-89BB-2A86C9F091C8}" type="datetime8">
               <a:rPr lang="en-US" smtClean="0"/>
-              <a:t>9/14/2017 6:56 PM</a:t>
+              <a:t>9/15/2017 11:51 AM</a:t>
             </a:fld>
             <a:endParaRPr lang="en-US" dirty="0"/>
           </a:p>
@@ -2957,7 +2957,7 @@
                 <a:tabLst/>
                 <a:defRPr/>
               </a:pPr>
-              <a:t>9/14/2017 6:41 PM</a:t>
+              <a:t>9/15/2017 11:51 AM</a:t>
             </a:fld>
             <a:endParaRPr kumimoji="0" lang="en-US" sz="1200" b="0" i="0" u="none" strike="noStrike" kern="1200" cap="none" spc="0" normalizeH="0" baseline="0" noProof="0" dirty="0">
               <a:ln>
@@ -3214,7 +3214,7 @@
           <a:p>
             <a:fld id="{38EEC551-8CDA-4EB6-89BB-2A86C9F091C8}" type="datetime8">
               <a:rPr lang="en-US" smtClean="0"/>
-              <a:t>9/14/2017 6:41 PM</a:t>
+              <a:t>9/15/2017 11:51 AM</a:t>
             </a:fld>
             <a:endParaRPr lang="en-US" dirty="0"/>
           </a:p>
@@ -3517,7 +3517,7 @@
                 <a:tabLst/>
                 <a:defRPr/>
               </a:pPr>
-              <a:t>9/14/2017 6:41 PM</a:t>
+              <a:t>9/15/2017 11:51 AM</a:t>
             </a:fld>
             <a:endParaRPr kumimoji="0" lang="en-US" sz="1200" b="0" i="0" u="none" strike="noStrike" kern="1200" cap="none" spc="0" normalizeH="0" baseline="0" noProof="0" dirty="0">
               <a:ln>
@@ -3892,7 +3892,7 @@
                 <a:tabLst/>
                 <a:defRPr/>
               </a:pPr>
-              <a:t>9/14/2017 6:41 PM</a:t>
+              <a:t>9/15/2017 11:51 AM</a:t>
             </a:fld>
             <a:endParaRPr kumimoji="0" lang="en-US" sz="1200" b="0" i="0" u="none" strike="noStrike" kern="1200" cap="none" spc="0" normalizeH="0" baseline="0" noProof="0" dirty="0">
               <a:ln>
@@ -4267,7 +4267,7 @@
                 <a:tabLst/>
                 <a:defRPr/>
               </a:pPr>
-              <a:t>9/14/2017 6:41 PM</a:t>
+              <a:t>9/15/2017 11:51 AM</a:t>
             </a:fld>
             <a:endParaRPr kumimoji="0" lang="en-US" sz="1200" b="0" i="0" u="none" strike="noStrike" kern="1200" cap="none" spc="0" normalizeH="0" baseline="0" noProof="0" dirty="0">
               <a:ln>
@@ -4524,7 +4524,7 @@
           <a:p>
             <a:fld id="{38EEC551-8CDA-4EB6-89BB-2A86C9F091C8}" type="datetime8">
               <a:rPr lang="en-US" smtClean="0"/>
-              <a:t>9/14/2017 6:41 PM</a:t>
+              <a:t>9/15/2017 11:51 AM</a:t>
             </a:fld>
             <a:endParaRPr lang="en-US" dirty="0"/>
           </a:p>
@@ -4705,7 +4705,7 @@
           <a:p>
             <a:fld id="{38EEC551-8CDA-4EB6-89BB-2A86C9F091C8}" type="datetime8">
               <a:rPr lang="en-US" smtClean="0"/>
-              <a:t>9/14/2017 6:41 PM</a:t>
+              <a:t>9/15/2017 11:51 AM</a:t>
             </a:fld>
             <a:endParaRPr lang="en-US" dirty="0"/>
           </a:p>
@@ -5178,7 +5178,7 @@
           <a:p>
             <a:fld id="{38EEC551-8CDA-4EB6-89BB-2A86C9F091C8}" type="datetime8">
               <a:rPr lang="en-US" smtClean="0"/>
-              <a:t>9/14/2017 6:41 PM</a:t>
+              <a:t>9/15/2017 11:51 AM</a:t>
             </a:fld>
             <a:endParaRPr lang="en-US" dirty="0"/>
           </a:p>
@@ -5363,7 +5363,7 @@
           <a:p>
             <a:fld id="{38EEC551-8CDA-4EB6-89BB-2A86C9F091C8}" type="datetime8">
               <a:rPr lang="en-US" smtClean="0"/>
-              <a:t>9/14/2017 6:41 PM</a:t>
+              <a:t>9/15/2017 11:51 AM</a:t>
             </a:fld>
             <a:endParaRPr lang="en-US" dirty="0"/>
           </a:p>
@@ -5544,7 +5544,7 @@
           <a:p>
             <a:fld id="{38EEC551-8CDA-4EB6-89BB-2A86C9F091C8}" type="datetime8">
               <a:rPr lang="en-US" smtClean="0"/>
-              <a:t>9/14/2017 6:41 PM</a:t>
+              <a:t>9/15/2017 11:51 AM</a:t>
             </a:fld>
             <a:endParaRPr lang="en-US" dirty="0"/>
           </a:p>
@@ -23445,7 +23445,7 @@
                 <a:ea typeface="Segoe UI" pitchFamily="34" charset="0"/>
                 <a:cs typeface="Segoe UI" pitchFamily="34" charset="0"/>
               </a:rPr>
-              <a:t>ASP.NET Core MVC + Razor Pages + API</a:t>
+              <a:t>ASP.NET Core (MVC + Razor Pages + API)</a:t>
             </a:r>
           </a:p>
         </p:txBody>
@@ -28418,6 +28418,12 @@
 </file>
 
 <file path=customXml/item2.xml><?xml version="1.0" encoding="utf-8"?>
+<p:properties xmlns:p="http://schemas.microsoft.com/office/2006/metadata/properties" xmlns:xsi="http://www.w3.org/2001/XMLSchema-instance" xmlns:pc="http://schemas.microsoft.com/office/infopath/2007/PartnerControls">
+  <documentManagement/>
+</p:properties>
+</file>
+
+<file path=customXml/item3.xml><?xml version="1.0" encoding="utf-8"?>
 <ct:contentTypeSchema xmlns:ct="http://schemas.microsoft.com/office/2006/metadata/contentType" xmlns:ma="http://schemas.microsoft.com/office/2006/metadata/properties/metaAttributes" ct:_="" ma:_="" ma:contentTypeName="Document" ma:contentTypeID="0x0101004C8AF336095DB84A94AB1A4B939C0475" ma:contentTypeVersion="4" ma:contentTypeDescription="Create a new document." ma:contentTypeScope="" ma:versionID="6f8327450122d2e4aedd139501eaa58b">
   <xsd:schema xmlns:xsd="http://www.w3.org/2001/XMLSchema" xmlns:xs="http://www.w3.org/2001/XMLSchema" xmlns:p="http://schemas.microsoft.com/office/2006/metadata/properties" xmlns:ns2="29eeffc7-3a1a-4f16-995c-1b7b58342919" targetNamespace="http://schemas.microsoft.com/office/2006/metadata/properties" ma:root="true" ma:fieldsID="7d6c3be25c216b690a82d24b3f2244b5" ns2:_="">
     <xsd:import namespace="29eeffc7-3a1a-4f16-995c-1b7b58342919"/>
@@ -28579,12 +28585,6 @@
 </ct:contentTypeSchema>
 </file>
 
-<file path=customXml/item3.xml><?xml version="1.0" encoding="utf-8"?>
-<p:properties xmlns:p="http://schemas.microsoft.com/office/2006/metadata/properties" xmlns:xsi="http://www.w3.org/2001/XMLSchema-instance" xmlns:pc="http://schemas.microsoft.com/office/infopath/2007/PartnerControls">
-  <documentManagement/>
-</p:properties>
-</file>
-
 <file path=customXml/itemProps1.xml><?xml version="1.0" encoding="utf-8"?>
 <ds:datastoreItem xmlns:ds="http://schemas.openxmlformats.org/officeDocument/2006/customXml" ds:itemID="{758FDAC0-319D-4A54-8D8E-1D42CB1F8004}">
   <ds:schemaRefs>
@@ -28594,6 +28594,22 @@
 </file>
 
 <file path=customXml/itemProps2.xml><?xml version="1.0" encoding="utf-8"?>
+<ds:datastoreItem xmlns:ds="http://schemas.openxmlformats.org/officeDocument/2006/customXml" ds:itemID="{F990F116-B58F-4255-B05B-DA3808E0E5C6}">
+  <ds:schemaRefs>
+    <ds:schemaRef ds:uri="http://purl.org/dc/terms/"/>
+    <ds:schemaRef ds:uri="29eeffc7-3a1a-4f16-995c-1b7b58342919"/>
+    <ds:schemaRef ds:uri="http://schemas.microsoft.com/office/infopath/2007/PartnerControls"/>
+    <ds:schemaRef ds:uri="http://purl.org/dc/elements/1.1/"/>
+    <ds:schemaRef ds:uri="http://schemas.microsoft.com/office/2006/documentManagement/types"/>
+    <ds:schemaRef ds:uri="http://schemas.microsoft.com/office/2006/metadata/properties"/>
+    <ds:schemaRef ds:uri="http://schemas.openxmlformats.org/package/2006/metadata/core-properties"/>
+    <ds:schemaRef ds:uri="http://www.w3.org/XML/1998/namespace"/>
+    <ds:schemaRef ds:uri="http://purl.org/dc/dcmitype/"/>
+  </ds:schemaRefs>
+</ds:datastoreItem>
+</file>
+
+<file path=customXml/itemProps3.xml><?xml version="1.0" encoding="utf-8"?>
 <ds:datastoreItem xmlns:ds="http://schemas.openxmlformats.org/officeDocument/2006/customXml" ds:itemID="{4C47C6CA-B255-4F53-A8A9-1A4E6D0653D8}">
   <ds:schemaRefs>
     <ds:schemaRef ds:uri="http://schemas.microsoft.com/office/2006/metadata/contentType"/>
@@ -28609,20 +28625,4 @@
     <ds:schemaRef ds:uri="http://schemas.microsoft.com/internal/obd"/>
   </ds:schemaRefs>
 </ds:datastoreItem>
-</file>
-
-<file path=customXml/itemProps3.xml><?xml version="1.0" encoding="utf-8"?>
-<ds:datastoreItem xmlns:ds="http://schemas.openxmlformats.org/officeDocument/2006/customXml" ds:itemID="{F990F116-B58F-4255-B05B-DA3808E0E5C6}">
-  <ds:schemaRefs>
-    <ds:schemaRef ds:uri="http://purl.org/dc/terms/"/>
-    <ds:schemaRef ds:uri="29eeffc7-3a1a-4f16-995c-1b7b58342919"/>
-    <ds:schemaRef ds:uri="http://schemas.microsoft.com/office/infopath/2007/PartnerControls"/>
-    <ds:schemaRef ds:uri="http://purl.org/dc/elements/1.1/"/>
-    <ds:schemaRef ds:uri="http://schemas.microsoft.com/office/2006/documentManagement/types"/>
-    <ds:schemaRef ds:uri="http://schemas.microsoft.com/office/2006/metadata/properties"/>
-    <ds:schemaRef ds:uri="http://schemas.openxmlformats.org/package/2006/metadata/core-properties"/>
-    <ds:schemaRef ds:uri="http://www.w3.org/XML/1998/namespace"/>
-    <ds:schemaRef ds:uri="http://purl.org/dc/dcmitype/"/>
-  </ds:schemaRefs>
-</ds:datastoreItem>
 </file>
</xml_diff>